<commit_message>
Changed size of thumbnails to make them equal in size; Added spacing around each thumbnail
</commit_message>
<xml_diff>
--- a/src/main/resources/static/image/projects/listMatching.pptx
+++ b/src/main/resources/static/image/projects/listMatching.pptx
@@ -104,6 +104,11 @@
       </a:defRPr>
     </a:lvl9pPr>
   </p:defaultTextStyle>
+  <p:extLst>
+    <p:ext uri="{EFAFB233-063F-42B5-8137-9DF3F51BA10A}">
+      <p15:sldGuideLst xmlns:p15="http://schemas.microsoft.com/office/powerpoint/2012/main"/>
+    </p:ext>
+  </p:extLst>
 </p:presentation>
 </file>
 
@@ -238,7 +243,7 @@
           <a:p>
             <a:fld id="{A3F66293-D49C-42CD-B3CA-46E87A1988F3}" type="datetimeFigureOut">
               <a:rPr lang="en-US" smtClean="0"/>
-              <a:t>2/13/2016</a:t>
+              <a:t>2/14/2016</a:t>
             </a:fld>
             <a:endParaRPr lang="en-US"/>
           </a:p>
@@ -408,7 +413,7 @@
           <a:p>
             <a:fld id="{A3F66293-D49C-42CD-B3CA-46E87A1988F3}" type="datetimeFigureOut">
               <a:rPr lang="en-US" smtClean="0"/>
-              <a:t>2/13/2016</a:t>
+              <a:t>2/14/2016</a:t>
             </a:fld>
             <a:endParaRPr lang="en-US"/>
           </a:p>
@@ -588,7 +593,7 @@
           <a:p>
             <a:fld id="{A3F66293-D49C-42CD-B3CA-46E87A1988F3}" type="datetimeFigureOut">
               <a:rPr lang="en-US" smtClean="0"/>
-              <a:t>2/13/2016</a:t>
+              <a:t>2/14/2016</a:t>
             </a:fld>
             <a:endParaRPr lang="en-US"/>
           </a:p>
@@ -758,7 +763,7 @@
           <a:p>
             <a:fld id="{A3F66293-D49C-42CD-B3CA-46E87A1988F3}" type="datetimeFigureOut">
               <a:rPr lang="en-US" smtClean="0"/>
-              <a:t>2/13/2016</a:t>
+              <a:t>2/14/2016</a:t>
             </a:fld>
             <a:endParaRPr lang="en-US"/>
           </a:p>
@@ -1004,7 +1009,7 @@
           <a:p>
             <a:fld id="{A3F66293-D49C-42CD-B3CA-46E87A1988F3}" type="datetimeFigureOut">
               <a:rPr lang="en-US" smtClean="0"/>
-              <a:t>2/13/2016</a:t>
+              <a:t>2/14/2016</a:t>
             </a:fld>
             <a:endParaRPr lang="en-US"/>
           </a:p>
@@ -1236,7 +1241,7 @@
           <a:p>
             <a:fld id="{A3F66293-D49C-42CD-B3CA-46E87A1988F3}" type="datetimeFigureOut">
               <a:rPr lang="en-US" smtClean="0"/>
-              <a:t>2/13/2016</a:t>
+              <a:t>2/14/2016</a:t>
             </a:fld>
             <a:endParaRPr lang="en-US"/>
           </a:p>
@@ -1603,7 +1608,7 @@
           <a:p>
             <a:fld id="{A3F66293-D49C-42CD-B3CA-46E87A1988F3}" type="datetimeFigureOut">
               <a:rPr lang="en-US" smtClean="0"/>
-              <a:t>2/13/2016</a:t>
+              <a:t>2/14/2016</a:t>
             </a:fld>
             <a:endParaRPr lang="en-US"/>
           </a:p>
@@ -1721,7 +1726,7 @@
           <a:p>
             <a:fld id="{A3F66293-D49C-42CD-B3CA-46E87A1988F3}" type="datetimeFigureOut">
               <a:rPr lang="en-US" smtClean="0"/>
-              <a:t>2/13/2016</a:t>
+              <a:t>2/14/2016</a:t>
             </a:fld>
             <a:endParaRPr lang="en-US"/>
           </a:p>
@@ -1816,7 +1821,7 @@
           <a:p>
             <a:fld id="{A3F66293-D49C-42CD-B3CA-46E87A1988F3}" type="datetimeFigureOut">
               <a:rPr lang="en-US" smtClean="0"/>
-              <a:t>2/13/2016</a:t>
+              <a:t>2/14/2016</a:t>
             </a:fld>
             <a:endParaRPr lang="en-US"/>
           </a:p>
@@ -2093,7 +2098,7 @@
           <a:p>
             <a:fld id="{A3F66293-D49C-42CD-B3CA-46E87A1988F3}" type="datetimeFigureOut">
               <a:rPr lang="en-US" smtClean="0"/>
-              <a:t>2/13/2016</a:t>
+              <a:t>2/14/2016</a:t>
             </a:fld>
             <a:endParaRPr lang="en-US"/>
           </a:p>
@@ -2346,7 +2351,7 @@
           <a:p>
             <a:fld id="{A3F66293-D49C-42CD-B3CA-46E87A1988F3}" type="datetimeFigureOut">
               <a:rPr lang="en-US" smtClean="0"/>
-              <a:t>2/13/2016</a:t>
+              <a:t>2/14/2016</a:t>
             </a:fld>
             <a:endParaRPr lang="en-US"/>
           </a:p>
@@ -2559,7 +2564,7 @@
           <a:p>
             <a:fld id="{A3F66293-D49C-42CD-B3CA-46E87A1988F3}" type="datetimeFigureOut">
               <a:rPr lang="en-US" smtClean="0"/>
-              <a:t>2/13/2016</a:t>
+              <a:t>2/14/2016</a:t>
             </a:fld>
             <a:endParaRPr lang="en-US"/>
           </a:p>
@@ -2972,10 +2977,10 @@
         </p:nvGrpSpPr>
         <p:grpSpPr>
           <a:xfrm>
-            <a:off x="1040123" y="237327"/>
-            <a:ext cx="10155298" cy="6395702"/>
+            <a:off x="1016900" y="215557"/>
+            <a:ext cx="10155298" cy="6434620"/>
             <a:chOff x="4435473" y="769262"/>
-            <a:chExt cx="5825786" cy="4612482"/>
+            <a:chExt cx="5825786" cy="4640549"/>
           </a:xfrm>
         </p:grpSpPr>
         <p:grpSp>
@@ -2987,9 +2992,9 @@
           <p:grpSpPr>
             <a:xfrm>
               <a:off x="4435473" y="769262"/>
-              <a:ext cx="5825786" cy="4612482"/>
+              <a:ext cx="5825786" cy="4640549"/>
               <a:chOff x="2985496" y="1161148"/>
-              <a:chExt cx="5825786" cy="4612482"/>
+              <a:chExt cx="5825786" cy="4640549"/>
             </a:xfrm>
           </p:grpSpPr>
           <p:sp>
@@ -3001,7 +3006,7 @@
             <p:spPr>
               <a:xfrm>
                 <a:off x="2985496" y="1161148"/>
-                <a:ext cx="914400" cy="322404"/>
+                <a:ext cx="914400" cy="288553"/>
               </a:xfrm>
               <a:prstGeom prst="rect">
                 <a:avLst/>
@@ -3021,10 +3026,10 @@
               <a:p>
                 <a:pPr algn="ctr"/>
                 <a:r>
-                  <a:rPr lang="en-US" dirty="0" smtClean="0"/>
+                  <a:rPr lang="en-US" sz="2000" b="1" dirty="0" smtClean="0"/>
                   <a:t>1</a:t>
                 </a:r>
-                <a:endParaRPr lang="en-US" dirty="0"/>
+                <a:endParaRPr lang="en-US" sz="2000" b="1" dirty="0"/>
               </a:p>
             </p:txBody>
           </p:sp>
@@ -3037,7 +3042,7 @@
             <p:spPr>
               <a:xfrm>
                 <a:off x="4213342" y="1161148"/>
-                <a:ext cx="914400" cy="322404"/>
+                <a:ext cx="914400" cy="288553"/>
               </a:xfrm>
               <a:prstGeom prst="rect">
                 <a:avLst/>
@@ -3057,10 +3062,10 @@
               <a:p>
                 <a:pPr algn="ctr"/>
                 <a:r>
-                  <a:rPr lang="en-US" dirty="0" smtClean="0"/>
+                  <a:rPr lang="en-US" sz="2000" b="1" dirty="0" smtClean="0"/>
                   <a:t>2</a:t>
                 </a:r>
-                <a:endParaRPr lang="en-US" dirty="0"/>
+                <a:endParaRPr lang="en-US" sz="2000" b="1" dirty="0"/>
               </a:p>
             </p:txBody>
           </p:sp>
@@ -3073,7 +3078,7 @@
             <p:spPr>
               <a:xfrm>
                 <a:off x="6669034" y="1161148"/>
-                <a:ext cx="914400" cy="322404"/>
+                <a:ext cx="914400" cy="288553"/>
               </a:xfrm>
               <a:prstGeom prst="rect">
                 <a:avLst/>
@@ -3093,10 +3098,10 @@
               <a:p>
                 <a:pPr algn="ctr"/>
                 <a:r>
-                  <a:rPr lang="en-US" dirty="0" smtClean="0"/>
+                  <a:rPr lang="en-US" sz="2000" b="1" dirty="0" smtClean="0"/>
                   <a:t>4</a:t>
                 </a:r>
-                <a:endParaRPr lang="en-US" dirty="0"/>
+                <a:endParaRPr lang="en-US" sz="2000" b="1" dirty="0"/>
               </a:p>
             </p:txBody>
           </p:sp>
@@ -3109,7 +3114,7 @@
             <p:spPr>
               <a:xfrm>
                 <a:off x="5441188" y="1161148"/>
-                <a:ext cx="914400" cy="322404"/>
+                <a:ext cx="914400" cy="288553"/>
               </a:xfrm>
               <a:prstGeom prst="rect">
                 <a:avLst/>
@@ -3129,10 +3134,10 @@
               <a:p>
                 <a:pPr algn="ctr"/>
                 <a:r>
-                  <a:rPr lang="en-US" dirty="0" smtClean="0"/>
+                  <a:rPr lang="en-US" sz="2000" b="1" dirty="0" smtClean="0"/>
                   <a:t>3</a:t>
                 </a:r>
-                <a:endParaRPr lang="en-US" dirty="0"/>
+                <a:endParaRPr lang="en-US" sz="2000" b="1" dirty="0"/>
               </a:p>
             </p:txBody>
           </p:sp>
@@ -3145,15 +3150,13 @@
             <p:spPr>
               <a:xfrm>
                 <a:off x="7896882" y="1161148"/>
-                <a:ext cx="914400" cy="322404"/>
+                <a:ext cx="914400" cy="288553"/>
               </a:xfrm>
               <a:prstGeom prst="rect">
                 <a:avLst/>
               </a:prstGeom>
               <a:solidFill>
-                <a:schemeClr val="accent2">
-                  <a:lumMod val="75000"/>
-                </a:schemeClr>
+                <a:srgbClr val="CC3333"/>
               </a:solidFill>
               <a:ln>
                 <a:noFill/>
@@ -3167,14 +3170,14 @@
               <a:p>
                 <a:pPr algn="ctr"/>
                 <a:r>
-                  <a:rPr lang="en-US" dirty="0" smtClean="0">
+                  <a:rPr lang="en-US" sz="2000" b="1" dirty="0" smtClean="0">
                     <a:solidFill>
                       <a:srgbClr val="FFFFFF"/>
                     </a:solidFill>
                   </a:rPr>
                   <a:t>MATCH</a:t>
                 </a:r>
-                <a:endParaRPr lang="en-US" dirty="0">
+                <a:endParaRPr lang="en-US" sz="2000" b="1" dirty="0">
                   <a:solidFill>
                     <a:srgbClr val="FFFFFF"/>
                   </a:solidFill>
@@ -3220,8 +3223,8 @@
             </p:nvSpPr>
             <p:spPr>
               <a:xfrm>
-                <a:off x="4213342" y="1874773"/>
-                <a:ext cx="914400" cy="369332"/>
+                <a:off x="4213342" y="1858029"/>
+                <a:ext cx="914400" cy="377338"/>
               </a:xfrm>
               <a:prstGeom prst="rect">
                 <a:avLst/>
@@ -3239,14 +3242,14 @@
               <a:p>
                 <a:pPr algn="ctr"/>
                 <a:r>
-                  <a:rPr lang="en-US" sz="1800" dirty="0" smtClean="0">
+                  <a:rPr lang="en-US" sz="2800" b="1" dirty="0" smtClean="0">
                     <a:solidFill>
                       <a:srgbClr val="FF6600"/>
                     </a:solidFill>
                   </a:rPr>
                   <a:t>n/a</a:t>
                 </a:r>
-                <a:endParaRPr lang="en-US" sz="1800" dirty="0">
+                <a:endParaRPr lang="en-US" sz="2800" b="1" dirty="0">
                   <a:solidFill>
                     <a:srgbClr val="FF6600"/>
                   </a:solidFill>
@@ -3286,104 +3289,14 @@
           </p:sp>
           <p:sp>
             <p:nvSpPr>
-              <p:cNvPr id="31" name="TextBox 30"/>
-              <p:cNvSpPr txBox="1"/>
-              <p:nvPr/>
-            </p:nvSpPr>
-            <p:spPr>
-              <a:xfrm>
-                <a:off x="7896882" y="2188723"/>
-                <a:ext cx="914400" cy="365760"/>
-              </a:xfrm>
-              <a:prstGeom prst="rect">
-                <a:avLst/>
-              </a:prstGeom>
-              <a:noFill/>
-              <a:ln>
-                <a:noFill/>
-              </a:ln>
-            </p:spPr>
-            <p:txBody>
-              <a:bodyPr wrap="square" rtlCol="0">
-                <a:spAutoFit/>
-              </a:bodyPr>
-              <a:lstStyle/>
-              <a:p>
-                <a:pPr algn="ctr"/>
-                <a:endParaRPr lang="en-US" sz="1800" dirty="0"/>
-              </a:p>
-            </p:txBody>
-          </p:sp>
-          <p:sp>
-            <p:nvSpPr>
-              <p:cNvPr id="37" name="TextBox 36"/>
-              <p:cNvSpPr txBox="1"/>
-              <p:nvPr/>
-            </p:nvSpPr>
-            <p:spPr>
-              <a:xfrm>
-                <a:off x="5441188" y="2531248"/>
-                <a:ext cx="914400" cy="365760"/>
-              </a:xfrm>
-              <a:prstGeom prst="rect">
-                <a:avLst/>
-              </a:prstGeom>
-              <a:noFill/>
-              <a:ln>
-                <a:noFill/>
-              </a:ln>
-            </p:spPr>
-            <p:txBody>
-              <a:bodyPr wrap="square" rtlCol="0">
-                <a:spAutoFit/>
-              </a:bodyPr>
-              <a:lstStyle/>
-              <a:p>
-                <a:pPr algn="ctr"/>
-                <a:endParaRPr lang="en-US" sz="1800" dirty="0"/>
-              </a:p>
-            </p:txBody>
-          </p:sp>
-          <p:sp>
-            <p:nvSpPr>
-              <p:cNvPr id="38" name="TextBox 37"/>
-              <p:cNvSpPr txBox="1"/>
-              <p:nvPr/>
-            </p:nvSpPr>
-            <p:spPr>
-              <a:xfrm>
-                <a:off x="7896882" y="2531248"/>
-                <a:ext cx="914400" cy="365760"/>
-              </a:xfrm>
-              <a:prstGeom prst="rect">
-                <a:avLst/>
-              </a:prstGeom>
-              <a:noFill/>
-              <a:ln>
-                <a:noFill/>
-              </a:ln>
-            </p:spPr>
-            <p:txBody>
-              <a:bodyPr wrap="square" rtlCol="0">
-                <a:spAutoFit/>
-              </a:bodyPr>
-              <a:lstStyle/>
-              <a:p>
-                <a:pPr algn="ctr"/>
-                <a:endParaRPr lang="en-US" sz="1800" dirty="0"/>
-              </a:p>
-            </p:txBody>
-          </p:sp>
-          <p:sp>
-            <p:nvSpPr>
               <p:cNvPr id="42" name="TextBox 41"/>
               <p:cNvSpPr txBox="1"/>
               <p:nvPr/>
             </p:nvSpPr>
             <p:spPr>
               <a:xfrm>
-                <a:off x="4213342" y="2873773"/>
-                <a:ext cx="914400" cy="369332"/>
+                <a:off x="4213342" y="2892615"/>
+                <a:ext cx="914400" cy="377338"/>
               </a:xfrm>
               <a:prstGeom prst="rect">
                 <a:avLst/>
@@ -3401,168 +3314,18 @@
               <a:p>
                 <a:pPr algn="ctr"/>
                 <a:r>
-                  <a:rPr lang="en-US" sz="1800" dirty="0" smtClean="0">
+                  <a:rPr lang="en-US" sz="2800" b="1" dirty="0" smtClean="0">
                     <a:solidFill>
                       <a:srgbClr val="FF6600"/>
                     </a:solidFill>
                   </a:rPr>
                   <a:t>n/a</a:t>
                 </a:r>
-                <a:endParaRPr lang="en-US" sz="1800" dirty="0">
+                <a:endParaRPr lang="en-US" sz="2800" b="1" dirty="0">
                   <a:solidFill>
                     <a:srgbClr val="FF6600"/>
                   </a:solidFill>
                 </a:endParaRPr>
-              </a:p>
-            </p:txBody>
-          </p:sp>
-          <p:sp>
-            <p:nvSpPr>
-              <p:cNvPr id="44" name="TextBox 43"/>
-              <p:cNvSpPr txBox="1"/>
-              <p:nvPr/>
-            </p:nvSpPr>
-            <p:spPr>
-              <a:xfrm>
-                <a:off x="5441188" y="2873773"/>
-                <a:ext cx="914400" cy="365760"/>
-              </a:xfrm>
-              <a:prstGeom prst="rect">
-                <a:avLst/>
-              </a:prstGeom>
-              <a:noFill/>
-              <a:ln>
-                <a:noFill/>
-              </a:ln>
-            </p:spPr>
-            <p:txBody>
-              <a:bodyPr wrap="square" rtlCol="0">
-                <a:spAutoFit/>
-              </a:bodyPr>
-              <a:lstStyle/>
-              <a:p>
-                <a:pPr algn="ctr"/>
-                <a:endParaRPr lang="en-US" sz="1800" dirty="0"/>
-              </a:p>
-            </p:txBody>
-          </p:sp>
-          <p:sp>
-            <p:nvSpPr>
-              <p:cNvPr id="45" name="TextBox 44"/>
-              <p:cNvSpPr txBox="1"/>
-              <p:nvPr/>
-            </p:nvSpPr>
-            <p:spPr>
-              <a:xfrm>
-                <a:off x="7896882" y="2873773"/>
-                <a:ext cx="914400" cy="365760"/>
-              </a:xfrm>
-              <a:prstGeom prst="rect">
-                <a:avLst/>
-              </a:prstGeom>
-              <a:noFill/>
-              <a:ln>
-                <a:noFill/>
-              </a:ln>
-            </p:spPr>
-            <p:txBody>
-              <a:bodyPr wrap="square" rtlCol="0">
-                <a:spAutoFit/>
-              </a:bodyPr>
-              <a:lstStyle/>
-              <a:p>
-                <a:pPr algn="ctr"/>
-                <a:endParaRPr lang="en-US" sz="1800" dirty="0"/>
-              </a:p>
-            </p:txBody>
-          </p:sp>
-          <p:sp>
-            <p:nvSpPr>
-              <p:cNvPr id="48" name="TextBox 47"/>
-              <p:cNvSpPr txBox="1"/>
-              <p:nvPr/>
-            </p:nvSpPr>
-            <p:spPr>
-              <a:xfrm>
-                <a:off x="2985496" y="3216298"/>
-                <a:ext cx="914400" cy="365760"/>
-              </a:xfrm>
-              <a:prstGeom prst="rect">
-                <a:avLst/>
-              </a:prstGeom>
-              <a:noFill/>
-              <a:ln>
-                <a:noFill/>
-              </a:ln>
-            </p:spPr>
-            <p:txBody>
-              <a:bodyPr wrap="square" rtlCol="0">
-                <a:spAutoFit/>
-              </a:bodyPr>
-              <a:lstStyle/>
-              <a:p>
-                <a:pPr algn="ctr"/>
-                <a:endParaRPr lang="en-US" sz="1800" dirty="0"/>
-              </a:p>
-            </p:txBody>
-          </p:sp>
-          <p:sp>
-            <p:nvSpPr>
-              <p:cNvPr id="51" name="TextBox 50"/>
-              <p:cNvSpPr txBox="1"/>
-              <p:nvPr/>
-            </p:nvSpPr>
-            <p:spPr>
-              <a:xfrm>
-                <a:off x="5441188" y="3216298"/>
-                <a:ext cx="914400" cy="365760"/>
-              </a:xfrm>
-              <a:prstGeom prst="rect">
-                <a:avLst/>
-              </a:prstGeom>
-              <a:noFill/>
-              <a:ln>
-                <a:noFill/>
-              </a:ln>
-            </p:spPr>
-            <p:txBody>
-              <a:bodyPr wrap="square" rtlCol="0">
-                <a:spAutoFit/>
-              </a:bodyPr>
-              <a:lstStyle/>
-              <a:p>
-                <a:pPr algn="ctr"/>
-                <a:endParaRPr lang="en-US" sz="1800" dirty="0"/>
-              </a:p>
-            </p:txBody>
-          </p:sp>
-          <p:sp>
-            <p:nvSpPr>
-              <p:cNvPr id="52" name="TextBox 51"/>
-              <p:cNvSpPr txBox="1"/>
-              <p:nvPr/>
-            </p:nvSpPr>
-            <p:spPr>
-              <a:xfrm>
-                <a:off x="7896882" y="3216298"/>
-                <a:ext cx="914400" cy="365760"/>
-              </a:xfrm>
-              <a:prstGeom prst="rect">
-                <a:avLst/>
-              </a:prstGeom>
-              <a:noFill/>
-              <a:ln>
-                <a:noFill/>
-              </a:ln>
-            </p:spPr>
-            <p:txBody>
-              <a:bodyPr wrap="square" rtlCol="0">
-                <a:spAutoFit/>
-              </a:bodyPr>
-              <a:lstStyle/>
-              <a:p>
-                <a:pPr algn="ctr"/>
-                <a:endParaRPr lang="en-US" sz="1800" dirty="0"/>
               </a:p>
             </p:txBody>
           </p:sp>
@@ -3574,8 +3337,8 @@
             </p:nvSpPr>
             <p:spPr>
               <a:xfrm>
-                <a:off x="2985496" y="3611075"/>
-                <a:ext cx="914400" cy="365760"/>
+                <a:off x="2985496" y="3695864"/>
+                <a:ext cx="914400" cy="377338"/>
               </a:xfrm>
               <a:prstGeom prst="rect">
                 <a:avLst/>
@@ -3593,14 +3356,14 @@
               <a:p>
                 <a:pPr algn="ctr"/>
                 <a:r>
-                  <a:rPr lang="en-US" sz="1800" dirty="0" smtClean="0">
+                  <a:rPr lang="en-US" sz="2800" b="1" dirty="0" smtClean="0">
                     <a:solidFill>
                       <a:srgbClr val="FF6600"/>
                     </a:solidFill>
                   </a:rPr>
                   <a:t>n/a</a:t>
                 </a:r>
-                <a:endParaRPr lang="en-US" sz="1800" dirty="0">
+                <a:endParaRPr lang="en-US" sz="2800" b="1" dirty="0">
                   <a:solidFill>
                     <a:srgbClr val="FF6600"/>
                   </a:solidFill>
@@ -3616,8 +3379,8 @@
             </p:nvSpPr>
             <p:spPr>
               <a:xfrm>
-                <a:off x="5441188" y="3611075"/>
-                <a:ext cx="914400" cy="365760"/>
+                <a:off x="5456176" y="3639338"/>
+                <a:ext cx="914400" cy="377338"/>
               </a:xfrm>
               <a:prstGeom prst="rect">
                 <a:avLst/>
@@ -3635,14 +3398,14 @@
               <a:p>
                 <a:pPr algn="ctr"/>
                 <a:r>
-                  <a:rPr lang="en-US" sz="1800" dirty="0" smtClean="0">
+                  <a:rPr lang="en-US" sz="2800" b="1" dirty="0" smtClean="0">
                     <a:solidFill>
                       <a:srgbClr val="FF6600"/>
                     </a:solidFill>
                   </a:rPr>
                   <a:t>n/a</a:t>
                 </a:r>
-                <a:endParaRPr lang="en-US" sz="1800" dirty="0">
+                <a:endParaRPr lang="en-US" sz="2800" b="1" dirty="0">
                   <a:solidFill>
                     <a:srgbClr val="FF6600"/>
                   </a:solidFill>
@@ -3688,8 +3451,8 @@
             </p:nvSpPr>
             <p:spPr>
               <a:xfrm>
-                <a:off x="2985496" y="3953685"/>
-                <a:ext cx="914400" cy="365760"/>
+                <a:off x="2985496" y="4019632"/>
+                <a:ext cx="914400" cy="377338"/>
               </a:xfrm>
               <a:prstGeom prst="rect">
                 <a:avLst/>
@@ -3707,14 +3470,14 @@
               <a:p>
                 <a:pPr algn="ctr"/>
                 <a:r>
-                  <a:rPr lang="en-US" sz="1800" dirty="0" smtClean="0">
+                  <a:rPr lang="en-US" sz="2800" b="1" dirty="0" smtClean="0">
                     <a:solidFill>
                       <a:srgbClr val="FF6600"/>
                     </a:solidFill>
                   </a:rPr>
                   <a:t>n/a</a:t>
                 </a:r>
-                <a:endParaRPr lang="en-US" sz="1800" dirty="0">
+                <a:endParaRPr lang="en-US" sz="2800" b="1" dirty="0">
                   <a:solidFill>
                     <a:srgbClr val="FF6600"/>
                   </a:solidFill>
@@ -3730,8 +3493,8 @@
             </p:nvSpPr>
             <p:spPr>
               <a:xfrm>
-                <a:off x="5441188" y="3964153"/>
-                <a:ext cx="914400" cy="365760"/>
+                <a:off x="5456176" y="3926469"/>
+                <a:ext cx="914400" cy="377338"/>
               </a:xfrm>
               <a:prstGeom prst="rect">
                 <a:avLst/>
@@ -3749,14 +3512,14 @@
               <a:p>
                 <a:pPr algn="ctr"/>
                 <a:r>
-                  <a:rPr lang="en-US" sz="1800" dirty="0" smtClean="0">
+                  <a:rPr lang="en-US" sz="2800" b="1" dirty="0" smtClean="0">
                     <a:solidFill>
                       <a:srgbClr val="FF6600"/>
                     </a:solidFill>
                   </a:rPr>
                   <a:t>n/a</a:t>
                 </a:r>
-                <a:endParaRPr lang="en-US" sz="1800" dirty="0">
+                <a:endParaRPr lang="en-US" sz="2800" b="1" dirty="0">
                   <a:solidFill>
                     <a:srgbClr val="FF6600"/>
                   </a:solidFill>
@@ -3802,8 +3565,8 @@
             </p:nvSpPr>
             <p:spPr>
               <a:xfrm>
-                <a:off x="2985496" y="4243873"/>
-                <a:ext cx="914400" cy="365760"/>
+                <a:off x="2985496" y="4338082"/>
+                <a:ext cx="914400" cy="377338"/>
               </a:xfrm>
               <a:prstGeom prst="rect">
                 <a:avLst/>
@@ -3821,14 +3584,14 @@
               <a:p>
                 <a:pPr algn="ctr"/>
                 <a:r>
-                  <a:rPr lang="en-US" sz="1800" dirty="0" smtClean="0">
+                  <a:rPr lang="en-US" sz="2800" b="1" dirty="0" smtClean="0">
                     <a:solidFill>
                       <a:srgbClr val="FF6600"/>
                     </a:solidFill>
                   </a:rPr>
                   <a:t>n/a</a:t>
                 </a:r>
-                <a:endParaRPr lang="en-US" sz="1800" dirty="0">
+                <a:endParaRPr lang="en-US" sz="2800" b="1" dirty="0">
                   <a:solidFill>
                     <a:srgbClr val="FF6600"/>
                   </a:solidFill>
@@ -3844,8 +3607,8 @@
             </p:nvSpPr>
             <p:spPr>
               <a:xfrm>
-                <a:off x="4213342" y="4243873"/>
-                <a:ext cx="914400" cy="365760"/>
+                <a:off x="4213342" y="4309820"/>
+                <a:ext cx="914400" cy="377338"/>
               </a:xfrm>
               <a:prstGeom prst="rect">
                 <a:avLst/>
@@ -3863,14 +3626,14 @@
               <a:p>
                 <a:pPr algn="ctr"/>
                 <a:r>
-                  <a:rPr lang="en-US" sz="1800" dirty="0" smtClean="0">
+                  <a:rPr lang="en-US" sz="2800" b="1" dirty="0" smtClean="0">
                     <a:solidFill>
                       <a:srgbClr val="FF6600"/>
                     </a:solidFill>
                   </a:rPr>
                   <a:t>n/a</a:t>
                 </a:r>
-                <a:endParaRPr lang="en-US" sz="1800" dirty="0">
+                <a:endParaRPr lang="en-US" sz="2800" b="1" dirty="0">
                   <a:solidFill>
                     <a:srgbClr val="FF6600"/>
                   </a:solidFill>
@@ -3916,8 +3679,8 @@
             </p:nvSpPr>
             <p:spPr>
               <a:xfrm>
-                <a:off x="2985496" y="4586398"/>
-                <a:ext cx="914400" cy="365760"/>
+                <a:off x="2985496" y="4624081"/>
+                <a:ext cx="914400" cy="377338"/>
               </a:xfrm>
               <a:prstGeom prst="rect">
                 <a:avLst/>
@@ -3935,14 +3698,14 @@
               <a:p>
                 <a:pPr algn="ctr"/>
                 <a:r>
-                  <a:rPr lang="en-US" sz="1800" dirty="0" smtClean="0">
+                  <a:rPr lang="en-US" sz="2800" b="1" dirty="0" smtClean="0">
                     <a:solidFill>
                       <a:srgbClr val="FF6600"/>
                     </a:solidFill>
                   </a:rPr>
                   <a:t>n/a</a:t>
                 </a:r>
-                <a:endParaRPr lang="en-US" sz="1800" dirty="0">
+                <a:endParaRPr lang="en-US" sz="2800" b="1" dirty="0">
                   <a:solidFill>
                     <a:srgbClr val="FF6600"/>
                   </a:solidFill>
@@ -3958,8 +3721,8 @@
             </p:nvSpPr>
             <p:spPr>
               <a:xfrm>
-                <a:off x="4213342" y="4586398"/>
-                <a:ext cx="914400" cy="365760"/>
+                <a:off x="4213342" y="4633502"/>
+                <a:ext cx="914400" cy="377338"/>
               </a:xfrm>
               <a:prstGeom prst="rect">
                 <a:avLst/>
@@ -3977,14 +3740,14 @@
               <a:p>
                 <a:pPr algn="ctr"/>
                 <a:r>
-                  <a:rPr lang="en-US" sz="1800" dirty="0" smtClean="0">
+                  <a:rPr lang="en-US" sz="2800" b="1" dirty="0" smtClean="0">
                     <a:solidFill>
                       <a:srgbClr val="FF6600"/>
                     </a:solidFill>
                   </a:rPr>
                   <a:t>n/a</a:t>
                 </a:r>
-                <a:endParaRPr lang="en-US" sz="1800" dirty="0">
+                <a:endParaRPr lang="en-US" sz="2800" b="1" dirty="0">
                   <a:solidFill>
                     <a:srgbClr val="FF6600"/>
                   </a:solidFill>
@@ -4091,7 +3854,7 @@
             <p:spPr>
               <a:xfrm>
                 <a:off x="2985496" y="5081830"/>
-                <a:ext cx="914400" cy="322404"/>
+                <a:ext cx="914400" cy="332946"/>
               </a:xfrm>
               <a:prstGeom prst="rect">
                 <a:avLst/>
@@ -4111,10 +3874,10 @@
               <a:p>
                 <a:pPr algn="ctr"/>
                 <a:r>
-                  <a:rPr lang="en-US" b="1" dirty="0" smtClean="0"/>
+                  <a:rPr lang="en-US" sz="2400" b="1" dirty="0" smtClean="0"/>
                   <a:t>9</a:t>
                 </a:r>
-                <a:endParaRPr lang="en-US" b="1" dirty="0"/>
+                <a:endParaRPr lang="en-US" sz="2400" b="1" dirty="0"/>
               </a:p>
             </p:txBody>
           </p:sp>
@@ -4127,7 +3890,7 @@
             <p:spPr>
               <a:xfrm>
                 <a:off x="4213342" y="5081830"/>
-                <a:ext cx="914400" cy="322404"/>
+                <a:ext cx="914400" cy="332946"/>
               </a:xfrm>
               <a:prstGeom prst="rect">
                 <a:avLst/>
@@ -4147,10 +3910,10 @@
               <a:p>
                 <a:pPr algn="ctr"/>
                 <a:r>
-                  <a:rPr lang="en-US" b="1" dirty="0" smtClean="0"/>
+                  <a:rPr lang="en-US" sz="2400" b="1" dirty="0" smtClean="0"/>
                   <a:t>10</a:t>
                 </a:r>
-                <a:endParaRPr lang="en-US" b="1" dirty="0"/>
+                <a:endParaRPr lang="en-US" sz="2400" b="1" dirty="0"/>
               </a:p>
             </p:txBody>
           </p:sp>
@@ -4163,7 +3926,7 @@
             <p:spPr>
               <a:xfrm>
                 <a:off x="6669034" y="5081830"/>
-                <a:ext cx="914400" cy="322404"/>
+                <a:ext cx="914400" cy="332946"/>
               </a:xfrm>
               <a:prstGeom prst="rect">
                 <a:avLst/>
@@ -4183,10 +3946,10 @@
               <a:p>
                 <a:pPr algn="ctr"/>
                 <a:r>
-                  <a:rPr lang="en-US" b="1" dirty="0" smtClean="0"/>
+                  <a:rPr lang="en-US" sz="2400" b="1" dirty="0" smtClean="0"/>
                   <a:t>8</a:t>
                 </a:r>
-                <a:endParaRPr lang="en-US" b="1" dirty="0"/>
+                <a:endParaRPr lang="en-US" sz="2400" b="1" dirty="0"/>
               </a:p>
             </p:txBody>
           </p:sp>
@@ -4199,7 +3962,7 @@
             <p:spPr>
               <a:xfrm>
                 <a:off x="5441188" y="5081830"/>
-                <a:ext cx="914400" cy="322404"/>
+                <a:ext cx="914400" cy="332946"/>
               </a:xfrm>
               <a:prstGeom prst="rect">
                 <a:avLst/>
@@ -4219,10 +3982,10 @@
               <a:p>
                 <a:pPr algn="ctr"/>
                 <a:r>
-                  <a:rPr lang="en-US" b="1" dirty="0" smtClean="0"/>
+                  <a:rPr lang="en-US" sz="2400" b="1" dirty="0" smtClean="0"/>
                   <a:t>7</a:t>
                 </a:r>
-                <a:endParaRPr lang="en-US" b="1" dirty="0"/>
+                <a:endParaRPr lang="en-US" sz="2400" b="1" dirty="0"/>
               </a:p>
             </p:txBody>
           </p:sp>
@@ -4235,15 +3998,13 @@
             <p:spPr>
               <a:xfrm>
                 <a:off x="7896882" y="5081830"/>
-                <a:ext cx="914400" cy="349271"/>
+                <a:ext cx="914400" cy="377338"/>
               </a:xfrm>
               <a:prstGeom prst="rect">
                 <a:avLst/>
               </a:prstGeom>
               <a:solidFill>
-                <a:schemeClr val="accent2">
-                  <a:lumMod val="75000"/>
-                </a:schemeClr>
+                <a:srgbClr val="CC3333"/>
               </a:solidFill>
               <a:ln>
                 <a:noFill/>
@@ -4257,14 +4018,14 @@
               <a:p>
                 <a:pPr algn="ctr"/>
                 <a:r>
-                  <a:rPr lang="en-US" sz="2000" b="1" dirty="0" smtClean="0">
+                  <a:rPr lang="en-US" sz="2800" b="1" dirty="0" smtClean="0">
                     <a:solidFill>
                       <a:srgbClr val="FFFFFF"/>
                     </a:solidFill>
                   </a:rPr>
                   <a:t>6</a:t>
                 </a:r>
-                <a:endParaRPr lang="en-US" sz="2000" b="1" dirty="0">
+                <a:endParaRPr lang="en-US" sz="2800" b="1" dirty="0">
                   <a:solidFill>
                     <a:srgbClr val="FFFFFF"/>
                   </a:solidFill>
@@ -4281,7 +4042,7 @@
             <p:spPr>
               <a:xfrm>
                 <a:off x="2985496" y="5424362"/>
-                <a:ext cx="914400" cy="322404"/>
+                <a:ext cx="914400" cy="332946"/>
               </a:xfrm>
               <a:prstGeom prst="rect">
                 <a:avLst/>
@@ -4301,10 +4062,10 @@
               <a:p>
                 <a:pPr algn="ctr"/>
                 <a:r>
-                  <a:rPr lang="en-US" b="1" dirty="0" smtClean="0"/>
+                  <a:rPr lang="en-US" sz="2400" b="1" dirty="0" smtClean="0"/>
                   <a:t>90%</a:t>
                 </a:r>
-                <a:endParaRPr lang="en-US" b="1" dirty="0"/>
+                <a:endParaRPr lang="en-US" sz="2400" b="1" dirty="0"/>
               </a:p>
             </p:txBody>
           </p:sp>
@@ -4317,7 +4078,7 @@
             <p:spPr>
               <a:xfrm>
                 <a:off x="4213342" y="5424362"/>
-                <a:ext cx="914400" cy="322404"/>
+                <a:ext cx="914400" cy="332946"/>
               </a:xfrm>
               <a:prstGeom prst="rect">
                 <a:avLst/>
@@ -4337,10 +4098,10 @@
               <a:p>
                 <a:pPr algn="ctr"/>
                 <a:r>
-                  <a:rPr lang="en-US" b="1" dirty="0" smtClean="0"/>
+                  <a:rPr lang="en-US" sz="2400" b="1" dirty="0" smtClean="0"/>
                   <a:t>100%</a:t>
                 </a:r>
-                <a:endParaRPr lang="en-US" b="1" dirty="0"/>
+                <a:endParaRPr lang="en-US" sz="2400" b="1" dirty="0"/>
               </a:p>
             </p:txBody>
           </p:sp>
@@ -4353,7 +4114,7 @@
             <p:spPr>
               <a:xfrm>
                 <a:off x="6669034" y="5424362"/>
-                <a:ext cx="914400" cy="322404"/>
+                <a:ext cx="914400" cy="332946"/>
               </a:xfrm>
               <a:prstGeom prst="rect">
                 <a:avLst/>
@@ -4373,10 +4134,10 @@
               <a:p>
                 <a:pPr algn="ctr"/>
                 <a:r>
-                  <a:rPr lang="en-US" b="1" dirty="0" smtClean="0"/>
+                  <a:rPr lang="en-US" sz="2400" b="1" dirty="0" smtClean="0"/>
                   <a:t>70%</a:t>
                 </a:r>
-                <a:endParaRPr lang="en-US" b="1" dirty="0"/>
+                <a:endParaRPr lang="en-US" sz="2400" b="1" dirty="0"/>
               </a:p>
             </p:txBody>
           </p:sp>
@@ -4389,7 +4150,7 @@
             <p:spPr>
               <a:xfrm>
                 <a:off x="5441188" y="5424362"/>
-                <a:ext cx="914400" cy="322404"/>
+                <a:ext cx="914400" cy="332946"/>
               </a:xfrm>
               <a:prstGeom prst="rect">
                 <a:avLst/>
@@ -4409,10 +4170,10 @@
               <a:p>
                 <a:pPr algn="ctr"/>
                 <a:r>
-                  <a:rPr lang="en-US" b="1" dirty="0" smtClean="0"/>
+                  <a:rPr lang="en-US" sz="2400" b="1" dirty="0" smtClean="0"/>
                   <a:t>70%</a:t>
                 </a:r>
-                <a:endParaRPr lang="en-US" b="1" dirty="0"/>
+                <a:endParaRPr lang="en-US" sz="2400" b="1" dirty="0"/>
               </a:p>
             </p:txBody>
           </p:sp>
@@ -4425,15 +4186,13 @@
             <p:spPr>
               <a:xfrm>
                 <a:off x="7896882" y="5424359"/>
-                <a:ext cx="914400" cy="349271"/>
+                <a:ext cx="914400" cy="377338"/>
               </a:xfrm>
               <a:prstGeom prst="rect">
                 <a:avLst/>
               </a:prstGeom>
               <a:solidFill>
-                <a:schemeClr val="accent2">
-                  <a:lumMod val="75000"/>
-                </a:schemeClr>
+                <a:srgbClr val="CC3333"/>
               </a:solidFill>
               <a:ln>
                 <a:noFill/>
@@ -4447,14 +4206,14 @@
               <a:p>
                 <a:pPr algn="ctr"/>
                 <a:r>
-                  <a:rPr lang="en-US" sz="2000" b="1" dirty="0" smtClean="0">
+                  <a:rPr lang="en-US" sz="2800" b="1" dirty="0" smtClean="0">
                     <a:solidFill>
                       <a:srgbClr val="FFFFFF"/>
                     </a:solidFill>
                   </a:rPr>
                   <a:t>60%</a:t>
                 </a:r>
-                <a:endParaRPr lang="en-US" sz="2000" b="1" dirty="0">
+                <a:endParaRPr lang="en-US" sz="2800" b="1" dirty="0">
                   <a:solidFill>
                     <a:srgbClr val="FFFFFF"/>
                   </a:solidFill>
@@ -5142,7 +4901,7 @@
           </p:blipFill>
           <p:spPr bwMode="auto">
             <a:xfrm>
-              <a:off x="5938072" y="2141381"/>
+              <a:off x="5938072" y="2160223"/>
               <a:ext cx="338953" cy="338953"/>
             </a:xfrm>
             <a:prstGeom prst="rect">
@@ -5183,7 +4942,7 @@
           </p:blipFill>
           <p:spPr bwMode="auto">
             <a:xfrm>
-              <a:off x="4710226" y="2132659"/>
+              <a:off x="4710226" y="2151500"/>
               <a:ext cx="338953" cy="338953"/>
             </a:xfrm>
             <a:prstGeom prst="rect">
@@ -5224,7 +4983,7 @@
           </p:blipFill>
           <p:spPr bwMode="auto">
             <a:xfrm>
-              <a:off x="4721459" y="2447470"/>
+              <a:off x="4721460" y="2508694"/>
               <a:ext cx="338953" cy="338953"/>
             </a:xfrm>
             <a:prstGeom prst="rect">
@@ -5265,7 +5024,7 @@
           </p:blipFill>
           <p:spPr bwMode="auto">
             <a:xfrm>
-              <a:off x="8405243" y="2447469"/>
+              <a:off x="8405242" y="2505180"/>
               <a:ext cx="338953" cy="338953"/>
             </a:xfrm>
             <a:prstGeom prst="rect">
@@ -5552,7 +5311,7 @@
           </p:blipFill>
           <p:spPr bwMode="auto">
             <a:xfrm>
-              <a:off x="5949550" y="3560359"/>
+              <a:off x="5949550" y="3598043"/>
               <a:ext cx="338953" cy="338953"/>
             </a:xfrm>
             <a:prstGeom prst="rect">

</xml_diff>